<commit_message>
modif elec + modif bom
</commit_message>
<xml_diff>
--- a/Electronique/Carte Robot (base sur un Teensy 3.6)/Schema fonctionnel.pptx
+++ b/Electronique/Carte Robot (base sur un Teensy 3.6)/Schema fonctionnel.pptx
@@ -5,7 +5,9 @@
     <p:sldMasterId id="2147483648" r:id="rId1"/>
   </p:sldMasterIdLst>
   <p:sldIdLst>
-    <p:sldId id="256" r:id="rId2"/>
+    <p:sldId id="257" r:id="rId2"/>
+    <p:sldId id="256" r:id="rId3"/>
+    <p:sldId id="258" r:id="rId4"/>
   </p:sldIdLst>
   <p:sldSz cx="12192000" cy="6858000"/>
   <p:notesSz cx="6858000" cy="9144000"/>
@@ -104,6 +106,11 @@
       </a:defRPr>
     </a:lvl9pPr>
   </p:defaultTextStyle>
+  <p:extLst>
+    <p:ext uri="{EFAFB233-063F-42B5-8137-9DF3F51BA10A}">
+      <p15:sldGuideLst xmlns:p15="http://schemas.microsoft.com/office/powerpoint/2012/main"/>
+    </p:ext>
+  </p:extLst>
 </p:presentation>
 </file>
 
@@ -254,7 +261,7 @@
           <a:p>
             <a:fld id="{824D4ABA-079A-4690-9E0C-4B3B8DE2C7E2}" type="datetimeFigureOut">
               <a:rPr lang="fr-FR" smtClean="0"/>
-              <a:t>25/07/2021</a:t>
+              <a:t>01/08/2021</a:t>
             </a:fld>
             <a:endParaRPr lang="fr-FR"/>
           </a:p>
@@ -452,7 +459,7 @@
           <a:p>
             <a:fld id="{824D4ABA-079A-4690-9E0C-4B3B8DE2C7E2}" type="datetimeFigureOut">
               <a:rPr lang="fr-FR" smtClean="0"/>
-              <a:t>25/07/2021</a:t>
+              <a:t>01/08/2021</a:t>
             </a:fld>
             <a:endParaRPr lang="fr-FR"/>
           </a:p>
@@ -660,7 +667,7 @@
           <a:p>
             <a:fld id="{824D4ABA-079A-4690-9E0C-4B3B8DE2C7E2}" type="datetimeFigureOut">
               <a:rPr lang="fr-FR" smtClean="0"/>
-              <a:t>25/07/2021</a:t>
+              <a:t>01/08/2021</a:t>
             </a:fld>
             <a:endParaRPr lang="fr-FR"/>
           </a:p>
@@ -858,7 +865,7 @@
           <a:p>
             <a:fld id="{824D4ABA-079A-4690-9E0C-4B3B8DE2C7E2}" type="datetimeFigureOut">
               <a:rPr lang="fr-FR" smtClean="0"/>
-              <a:t>25/07/2021</a:t>
+              <a:t>01/08/2021</a:t>
             </a:fld>
             <a:endParaRPr lang="fr-FR"/>
           </a:p>
@@ -1133,7 +1140,7 @@
           <a:p>
             <a:fld id="{824D4ABA-079A-4690-9E0C-4B3B8DE2C7E2}" type="datetimeFigureOut">
               <a:rPr lang="fr-FR" smtClean="0"/>
-              <a:t>25/07/2021</a:t>
+              <a:t>01/08/2021</a:t>
             </a:fld>
             <a:endParaRPr lang="fr-FR"/>
           </a:p>
@@ -1398,7 +1405,7 @@
           <a:p>
             <a:fld id="{824D4ABA-079A-4690-9E0C-4B3B8DE2C7E2}" type="datetimeFigureOut">
               <a:rPr lang="fr-FR" smtClean="0"/>
-              <a:t>25/07/2021</a:t>
+              <a:t>01/08/2021</a:t>
             </a:fld>
             <a:endParaRPr lang="fr-FR"/>
           </a:p>
@@ -1810,7 +1817,7 @@
           <a:p>
             <a:fld id="{824D4ABA-079A-4690-9E0C-4B3B8DE2C7E2}" type="datetimeFigureOut">
               <a:rPr lang="fr-FR" smtClean="0"/>
-              <a:t>25/07/2021</a:t>
+              <a:t>01/08/2021</a:t>
             </a:fld>
             <a:endParaRPr lang="fr-FR"/>
           </a:p>
@@ -1951,7 +1958,7 @@
           <a:p>
             <a:fld id="{824D4ABA-079A-4690-9E0C-4B3B8DE2C7E2}" type="datetimeFigureOut">
               <a:rPr lang="fr-FR" smtClean="0"/>
-              <a:t>25/07/2021</a:t>
+              <a:t>01/08/2021</a:t>
             </a:fld>
             <a:endParaRPr lang="fr-FR"/>
           </a:p>
@@ -2064,7 +2071,7 @@
           <a:p>
             <a:fld id="{824D4ABA-079A-4690-9E0C-4B3B8DE2C7E2}" type="datetimeFigureOut">
               <a:rPr lang="fr-FR" smtClean="0"/>
-              <a:t>25/07/2021</a:t>
+              <a:t>01/08/2021</a:t>
             </a:fld>
             <a:endParaRPr lang="fr-FR"/>
           </a:p>
@@ -2375,7 +2382,7 @@
           <a:p>
             <a:fld id="{824D4ABA-079A-4690-9E0C-4B3B8DE2C7E2}" type="datetimeFigureOut">
               <a:rPr lang="fr-FR" smtClean="0"/>
-              <a:t>25/07/2021</a:t>
+              <a:t>01/08/2021</a:t>
             </a:fld>
             <a:endParaRPr lang="fr-FR"/>
           </a:p>
@@ -2663,7 +2670,7 @@
           <a:p>
             <a:fld id="{824D4ABA-079A-4690-9E0C-4B3B8DE2C7E2}" type="datetimeFigureOut">
               <a:rPr lang="fr-FR" smtClean="0"/>
-              <a:t>25/07/2021</a:t>
+              <a:t>01/08/2021</a:t>
             </a:fld>
             <a:endParaRPr lang="fr-FR"/>
           </a:p>
@@ -2904,7 +2911,7 @@
           <a:p>
             <a:fld id="{824D4ABA-079A-4690-9E0C-4B3B8DE2C7E2}" type="datetimeFigureOut">
               <a:rPr lang="fr-FR" smtClean="0"/>
-              <a:t>25/07/2021</a:t>
+              <a:t>01/08/2021</a:t>
             </a:fld>
             <a:endParaRPr lang="fr-FR"/>
           </a:p>
@@ -3323,6 +3330,208 @@
       </p:grpSpPr>
       <p:sp>
         <p:nvSpPr>
+          <p:cNvPr id="2" name="Titre 1">
+            <a:extLst>
+              <a:ext uri="{FF2B5EF4-FFF2-40B4-BE49-F238E27FC236}">
+                <a16:creationId xmlns:a16="http://schemas.microsoft.com/office/drawing/2014/main" id="{6EF5BE9F-6CBF-424E-9DBC-B96045A2D827}"/>
+              </a:ext>
+            </a:extLst>
+          </p:cNvPr>
+          <p:cNvSpPr>
+            <a:spLocks noGrp="1"/>
+          </p:cNvSpPr>
+          <p:nvPr>
+            <p:ph type="title"/>
+          </p:nvPr>
+        </p:nvSpPr>
+        <p:spPr/>
+        <p:txBody>
+          <a:bodyPr/>
+          <a:lstStyle/>
+          <a:p>
+            <a:r>
+              <a:rPr lang="fr-FR" b="1" dirty="0"/>
+              <a:t>Carte Robot Teensy</a:t>
+            </a:r>
+          </a:p>
+        </p:txBody>
+      </p:sp>
+      <p:sp>
+        <p:nvSpPr>
+          <p:cNvPr id="3" name="Espace réservé du contenu 2">
+            <a:extLst>
+              <a:ext uri="{FF2B5EF4-FFF2-40B4-BE49-F238E27FC236}">
+                <a16:creationId xmlns:a16="http://schemas.microsoft.com/office/drawing/2014/main" id="{E04E7B54-8518-4718-A86D-4A52DFAF3931}"/>
+              </a:ext>
+            </a:extLst>
+          </p:cNvPr>
+          <p:cNvSpPr>
+            <a:spLocks noGrp="1"/>
+          </p:cNvSpPr>
+          <p:nvPr>
+            <p:ph idx="1"/>
+          </p:nvPr>
+        </p:nvSpPr>
+        <p:spPr/>
+        <p:txBody>
+          <a:bodyPr/>
+          <a:lstStyle/>
+          <a:p>
+            <a:pPr>
+              <a:buFont typeface="Wingdings" panose="05000000000000000000" pitchFamily="2" charset="2"/>
+              <a:buChar char="§"/>
+            </a:pPr>
+            <a:r>
+              <a:rPr lang="fr-FR" dirty="0"/>
+              <a:t>Déplacement autonome (Pas à pas et codeurs rotatifs) </a:t>
+            </a:r>
+            <a:r>
+              <a:rPr lang="fr-FR" dirty="0">
+                <a:solidFill>
+                  <a:srgbClr val="FF0000"/>
+                </a:solidFill>
+              </a:rPr>
+              <a:t>PWM (2)</a:t>
+            </a:r>
+            <a:endParaRPr lang="fr-FR" dirty="0"/>
+          </a:p>
+          <a:p>
+            <a:pPr>
+              <a:buFont typeface="Wingdings" panose="05000000000000000000" pitchFamily="2" charset="2"/>
+              <a:buChar char="§"/>
+            </a:pPr>
+            <a:r>
+              <a:rPr lang="fr-FR" dirty="0"/>
+              <a:t>Détection d’obstacle (Lidar) </a:t>
+            </a:r>
+            <a:r>
+              <a:rPr lang="fr-FR" dirty="0">
+                <a:solidFill>
+                  <a:srgbClr val="FF0000"/>
+                </a:solidFill>
+              </a:rPr>
+              <a:t>Serial (1)</a:t>
+            </a:r>
+            <a:endParaRPr lang="fr-FR" dirty="0"/>
+          </a:p>
+          <a:p>
+            <a:pPr>
+              <a:buFont typeface="Wingdings" panose="05000000000000000000" pitchFamily="2" charset="2"/>
+              <a:buChar char="§"/>
+            </a:pPr>
+            <a:r>
+              <a:rPr lang="fr-FR" dirty="0"/>
+              <a:t>Recalage du robot (Microswitch)</a:t>
+            </a:r>
+          </a:p>
+          <a:p>
+            <a:pPr>
+              <a:buFont typeface="Wingdings" panose="05000000000000000000" pitchFamily="2" charset="2"/>
+              <a:buChar char="§"/>
+            </a:pPr>
+            <a:r>
+              <a:rPr lang="fr-FR" dirty="0"/>
+              <a:t>Tirette de démarrage</a:t>
+            </a:r>
+          </a:p>
+          <a:p>
+            <a:pPr>
+              <a:buFont typeface="Wingdings" panose="05000000000000000000" pitchFamily="2" charset="2"/>
+              <a:buChar char="§"/>
+            </a:pPr>
+            <a:r>
+              <a:rPr lang="fr-FR" dirty="0"/>
+              <a:t>Communication sans-fil (nRF24L01) </a:t>
+            </a:r>
+            <a:r>
+              <a:rPr lang="fr-FR" dirty="0">
+                <a:solidFill>
+                  <a:srgbClr val="FF0000"/>
+                </a:solidFill>
+              </a:rPr>
+              <a:t>SPI (1)</a:t>
+            </a:r>
+          </a:p>
+          <a:p>
+            <a:pPr>
+              <a:buFont typeface="Wingdings" panose="05000000000000000000" pitchFamily="2" charset="2"/>
+              <a:buChar char="§"/>
+            </a:pPr>
+            <a:r>
+              <a:rPr lang="fr-FR" dirty="0"/>
+              <a:t>Mesure tension batterie </a:t>
+            </a:r>
+            <a:r>
+              <a:rPr lang="fr-FR" dirty="0">
+                <a:solidFill>
+                  <a:srgbClr val="FF0000"/>
+                </a:solidFill>
+              </a:rPr>
+              <a:t>Analog (1)</a:t>
+            </a:r>
+          </a:p>
+          <a:p>
+            <a:pPr>
+              <a:buFont typeface="Wingdings" panose="05000000000000000000" pitchFamily="2" charset="2"/>
+              <a:buChar char="§"/>
+            </a:pPr>
+            <a:r>
+              <a:rPr lang="fr-FR" dirty="0"/>
+              <a:t>Interface Homme-Machine </a:t>
+            </a:r>
+            <a:r>
+              <a:rPr lang="fr-FR" dirty="0">
+                <a:solidFill>
+                  <a:srgbClr val="FF0000"/>
+                </a:solidFill>
+              </a:rPr>
+              <a:t>Serial (1) ou I²C (1)</a:t>
+            </a:r>
+          </a:p>
+          <a:p>
+            <a:pPr>
+              <a:buFont typeface="Wingdings" panose="05000000000000000000" pitchFamily="2" charset="2"/>
+              <a:buChar char="§"/>
+            </a:pPr>
+            <a:r>
+              <a:rPr lang="fr-FR" dirty="0"/>
+              <a:t>Changement de côté (Switch)</a:t>
+            </a:r>
+          </a:p>
+        </p:txBody>
+      </p:sp>
+    </p:spTree>
+    <p:extLst>
+      <p:ext uri="{BB962C8B-B14F-4D97-AF65-F5344CB8AC3E}">
+        <p14:creationId xmlns:p14="http://schemas.microsoft.com/office/powerpoint/2010/main" val="1675554654"/>
+      </p:ext>
+    </p:extLst>
+  </p:cSld>
+  <p:clrMapOvr>
+    <a:masterClrMapping/>
+  </p:clrMapOvr>
+</p:sld>
+</file>
+
+<file path=ppt/slides/slide2.xml><?xml version="1.0" encoding="utf-8"?>
+<p:sld xmlns:a="http://schemas.openxmlformats.org/drawingml/2006/main" xmlns:r="http://schemas.openxmlformats.org/officeDocument/2006/relationships" xmlns:p="http://schemas.openxmlformats.org/presentationml/2006/main">
+  <p:cSld>
+    <p:spTree>
+      <p:nvGrpSpPr>
+        <p:cNvPr id="1" name=""/>
+        <p:cNvGrpSpPr/>
+        <p:nvPr/>
+      </p:nvGrpSpPr>
+      <p:grpSpPr>
+        <a:xfrm>
+          <a:off x="0" y="0"/>
+          <a:ext cx="0" cy="0"/>
+          <a:chOff x="0" y="0"/>
+          <a:chExt cx="0" cy="0"/>
+        </a:xfrm>
+      </p:grpSpPr>
+      <p:sp>
+        <p:nvSpPr>
           <p:cNvPr id="4" name="Rectangle 3">
             <a:extLst>
               <a:ext uri="{FF2B5EF4-FFF2-40B4-BE49-F238E27FC236}">
@@ -3335,7 +3544,7 @@
         </p:nvSpPr>
         <p:spPr>
           <a:xfrm>
-            <a:off x="2063552" y="1268760"/>
+            <a:off x="1199456" y="1052736"/>
             <a:ext cx="648072" cy="576064"/>
           </a:xfrm>
           <a:prstGeom prst="rect">
@@ -3392,7 +3601,7 @@
         </p:nvSpPr>
         <p:spPr>
           <a:xfrm>
-            <a:off x="2999656" y="1268760"/>
+            <a:off x="2135560" y="1052736"/>
             <a:ext cx="648072" cy="576064"/>
           </a:xfrm>
           <a:prstGeom prst="rect">
@@ -3453,7 +3662,7 @@
         </p:nvCxnSpPr>
         <p:spPr>
           <a:xfrm>
-            <a:off x="2711624" y="1556792"/>
+            <a:off x="1847528" y="1340768"/>
             <a:ext cx="288032" cy="0"/>
           </a:xfrm>
           <a:prstGeom prst="straightConnector1">
@@ -3495,7 +3704,7 @@
         </p:nvCxnSpPr>
         <p:spPr>
           <a:xfrm>
-            <a:off x="1775520" y="1556792"/>
+            <a:off x="911424" y="1340768"/>
             <a:ext cx="288032" cy="0"/>
           </a:xfrm>
           <a:prstGeom prst="straightConnector1">
@@ -3534,7 +3743,7 @@
         </p:nvSpPr>
         <p:spPr>
           <a:xfrm>
-            <a:off x="1199456" y="1412776"/>
+            <a:off x="335360" y="1196752"/>
             <a:ext cx="576064" cy="307777"/>
           </a:xfrm>
           <a:prstGeom prst="rect">
@@ -3570,7 +3779,7 @@
         </p:nvSpPr>
         <p:spPr>
           <a:xfrm>
-            <a:off x="3935760" y="1412776"/>
+            <a:off x="3071664" y="1196752"/>
             <a:ext cx="792088" cy="288032"/>
           </a:xfrm>
           <a:prstGeom prst="rect">
@@ -3623,7 +3832,7 @@
         </p:nvCxnSpPr>
         <p:spPr>
           <a:xfrm>
-            <a:off x="3647728" y="1556792"/>
+            <a:off x="2783632" y="1340768"/>
             <a:ext cx="288032" cy="0"/>
           </a:xfrm>
           <a:prstGeom prst="straightConnector1">
@@ -3662,7 +3871,7 @@
         </p:nvSpPr>
         <p:spPr>
           <a:xfrm>
-            <a:off x="6528048" y="1412776"/>
+            <a:off x="5663952" y="1196752"/>
             <a:ext cx="792088" cy="288032"/>
           </a:xfrm>
           <a:prstGeom prst="rect">
@@ -3715,7 +3924,7 @@
         </p:nvCxnSpPr>
         <p:spPr>
           <a:xfrm>
-            <a:off x="4727848" y="1556792"/>
+            <a:off x="3863752" y="1340768"/>
             <a:ext cx="1800200" cy="0"/>
           </a:xfrm>
           <a:prstGeom prst="straightConnector1">
@@ -3757,7 +3966,7 @@
         </p:nvCxnSpPr>
         <p:spPr>
           <a:xfrm>
-            <a:off x="7320136" y="1556792"/>
+            <a:off x="6456040" y="1340768"/>
             <a:ext cx="360040" cy="0"/>
           </a:xfrm>
           <a:prstGeom prst="straightConnector1">
@@ -3796,7 +4005,7 @@
         </p:nvSpPr>
         <p:spPr>
           <a:xfrm>
-            <a:off x="7680176" y="1412776"/>
+            <a:off x="6816080" y="1196752"/>
             <a:ext cx="576064" cy="307777"/>
           </a:xfrm>
           <a:prstGeom prst="rect">
@@ -3855,7 +4064,7 @@
         </p:blipFill>
         <p:spPr>
           <a:xfrm flipH="1">
-            <a:off x="2495600" y="836712"/>
+            <a:off x="1631504" y="620688"/>
             <a:ext cx="648953" cy="347820"/>
           </a:xfrm>
           <a:prstGeom prst="rect">
@@ -3877,7 +4086,7 @@
         </p:nvSpPr>
         <p:spPr>
           <a:xfrm>
-            <a:off x="1703512" y="576064"/>
+            <a:off x="839416" y="360040"/>
             <a:ext cx="2232248" cy="307777"/>
           </a:xfrm>
           <a:prstGeom prst="rect">
@@ -3917,7 +4126,7 @@
         </p:nvCxnSpPr>
         <p:spPr>
           <a:xfrm>
-            <a:off x="4331804" y="1700808"/>
+            <a:off x="3467708" y="1484784"/>
             <a:ext cx="0" cy="833582"/>
           </a:xfrm>
           <a:prstGeom prst="straightConnector1">
@@ -3956,7 +4165,7 @@
         </p:nvSpPr>
         <p:spPr>
           <a:xfrm>
-            <a:off x="3802907" y="2534390"/>
+            <a:off x="2938811" y="2318366"/>
             <a:ext cx="1057793" cy="576064"/>
           </a:xfrm>
           <a:prstGeom prst="rect">
@@ -4012,7 +4221,7 @@
         </p:nvSpPr>
         <p:spPr>
           <a:xfrm>
-            <a:off x="3215680" y="3501008"/>
+            <a:off x="2351584" y="3284984"/>
             <a:ext cx="2232248" cy="307777"/>
           </a:xfrm>
           <a:prstGeom prst="rect">
@@ -4052,7 +4261,7 @@
         </p:nvCxnSpPr>
         <p:spPr>
           <a:xfrm>
-            <a:off x="4331804" y="3110454"/>
+            <a:off x="3467708" y="2894430"/>
             <a:ext cx="0" cy="390554"/>
           </a:xfrm>
           <a:prstGeom prst="straightConnector1">
@@ -4079,10 +4288,10 @@
       </p:cxnSp>
       <p:sp>
         <p:nvSpPr>
-          <p:cNvPr id="70" name="Rectangle 69">
-            <a:extLst>
-              <a:ext uri="{FF2B5EF4-FFF2-40B4-BE49-F238E27FC236}">
-                <a16:creationId xmlns:a16="http://schemas.microsoft.com/office/drawing/2014/main" id="{E4EA6977-DAB6-49F3-A975-3A93726957B1}"/>
+          <p:cNvPr id="91" name="Ellipse 90">
+            <a:extLst>
+              <a:ext uri="{FF2B5EF4-FFF2-40B4-BE49-F238E27FC236}">
+                <a16:creationId xmlns:a16="http://schemas.microsoft.com/office/drawing/2014/main" id="{3A7D2F06-B06B-402D-8640-17B76B6D47A5}"/>
               </a:ext>
             </a:extLst>
           </p:cNvPr>
@@ -4091,234 +4300,7 @@
         </p:nvSpPr>
         <p:spPr>
           <a:xfrm>
-            <a:off x="6384032" y="2204864"/>
-            <a:ext cx="1080120" cy="576064"/>
-          </a:xfrm>
-          <a:prstGeom prst="rect">
-            <a:avLst/>
-          </a:prstGeom>
-        </p:spPr>
-        <p:style>
-          <a:lnRef idx="2">
-            <a:schemeClr val="dk1">
-              <a:shade val="50000"/>
-            </a:schemeClr>
-          </a:lnRef>
-          <a:fillRef idx="1">
-            <a:schemeClr val="dk1"/>
-          </a:fillRef>
-          <a:effectRef idx="0">
-            <a:schemeClr val="dk1"/>
-          </a:effectRef>
-          <a:fontRef idx="minor">
-            <a:schemeClr val="lt1"/>
-          </a:fontRef>
-        </p:style>
-        <p:txBody>
-          <a:bodyPr rtlCol="0" anchor="ctr"/>
-          <a:lstStyle/>
-          <a:p>
-            <a:pPr algn="ctr"/>
-            <a:r>
-              <a:rPr lang="fr-FR" sz="1400" b="1" dirty="0"/>
-              <a:t>Régulateur</a:t>
-            </a:r>
-          </a:p>
-          <a:p>
-            <a:pPr algn="ctr"/>
-            <a:r>
-              <a:rPr lang="fr-FR" sz="1400" b="1" dirty="0"/>
-              <a:t>6,5V 1A</a:t>
-            </a:r>
-          </a:p>
-        </p:txBody>
-      </p:sp>
-      <p:cxnSp>
-        <p:nvCxnSpPr>
-          <p:cNvPr id="72" name="Connecteur droit avec flèche 71">
-            <a:extLst>
-              <a:ext uri="{FF2B5EF4-FFF2-40B4-BE49-F238E27FC236}">
-                <a16:creationId xmlns:a16="http://schemas.microsoft.com/office/drawing/2014/main" id="{76A56747-5DA4-4D72-A521-783AC450D912}"/>
-              </a:ext>
-            </a:extLst>
-          </p:cNvPr>
-          <p:cNvCxnSpPr>
-            <a:cxnSpLocks/>
-            <a:stCxn id="25" idx="2"/>
-            <a:endCxn id="70" idx="0"/>
-          </p:cNvCxnSpPr>
-          <p:nvPr/>
-        </p:nvCxnSpPr>
-        <p:spPr>
-          <a:xfrm>
-            <a:off x="6924092" y="1700808"/>
-            <a:ext cx="0" cy="504056"/>
-          </a:xfrm>
-          <a:prstGeom prst="straightConnector1">
-            <a:avLst/>
-          </a:prstGeom>
-          <a:ln>
-            <a:tailEnd type="triangle"/>
-          </a:ln>
-        </p:spPr>
-        <p:style>
-          <a:lnRef idx="1">
-            <a:schemeClr val="dk1"/>
-          </a:lnRef>
-          <a:fillRef idx="0">
-            <a:schemeClr val="dk1"/>
-          </a:fillRef>
-          <a:effectRef idx="0">
-            <a:schemeClr val="dk1"/>
-          </a:effectRef>
-          <a:fontRef idx="minor">
-            <a:schemeClr val="tx1"/>
-          </a:fontRef>
-        </p:style>
-      </p:cxnSp>
-      <p:sp>
-        <p:nvSpPr>
-          <p:cNvPr id="84" name="Rectangle 83">
-            <a:extLst>
-              <a:ext uri="{FF2B5EF4-FFF2-40B4-BE49-F238E27FC236}">
-                <a16:creationId xmlns:a16="http://schemas.microsoft.com/office/drawing/2014/main" id="{500AA41E-8F05-478B-A30E-3FA011FCD618}"/>
-              </a:ext>
-            </a:extLst>
-          </p:cNvPr>
-          <p:cNvSpPr/>
-          <p:nvPr/>
-        </p:nvSpPr>
-        <p:spPr>
-          <a:xfrm>
-            <a:off x="6384032" y="2852936"/>
-            <a:ext cx="1080120" cy="576064"/>
-          </a:xfrm>
-          <a:prstGeom prst="rect">
-            <a:avLst/>
-          </a:prstGeom>
-        </p:spPr>
-        <p:style>
-          <a:lnRef idx="2">
-            <a:schemeClr val="dk1">
-              <a:shade val="50000"/>
-            </a:schemeClr>
-          </a:lnRef>
-          <a:fillRef idx="1">
-            <a:schemeClr val="dk1"/>
-          </a:fillRef>
-          <a:effectRef idx="0">
-            <a:schemeClr val="dk1"/>
-          </a:effectRef>
-          <a:fontRef idx="minor">
-            <a:schemeClr val="lt1"/>
-          </a:fontRef>
-        </p:style>
-        <p:txBody>
-          <a:bodyPr rtlCol="0" anchor="ctr"/>
-          <a:lstStyle/>
-          <a:p>
-            <a:pPr algn="ctr"/>
-            <a:r>
-              <a:rPr lang="fr-FR" sz="1400" b="1" dirty="0"/>
-              <a:t>Régulateur</a:t>
-            </a:r>
-          </a:p>
-          <a:p>
-            <a:pPr algn="ctr"/>
-            <a:r>
-              <a:rPr lang="fr-FR" sz="1400" b="1" dirty="0"/>
-              <a:t>9V 1A</a:t>
-            </a:r>
-          </a:p>
-        </p:txBody>
-      </p:sp>
-      <p:sp>
-        <p:nvSpPr>
-          <p:cNvPr id="85" name="ZoneTexte 84">
-            <a:extLst>
-              <a:ext uri="{FF2B5EF4-FFF2-40B4-BE49-F238E27FC236}">
-                <a16:creationId xmlns:a16="http://schemas.microsoft.com/office/drawing/2014/main" id="{F09DB0CD-18BA-41ED-8C04-52FA2005DD28}"/>
-              </a:ext>
-            </a:extLst>
-          </p:cNvPr>
-          <p:cNvSpPr txBox="1"/>
-          <p:nvPr/>
-        </p:nvSpPr>
-        <p:spPr>
-          <a:xfrm>
-            <a:off x="7464152" y="2348880"/>
-            <a:ext cx="720080" cy="307777"/>
-          </a:xfrm>
-          <a:prstGeom prst="rect">
-            <a:avLst/>
-          </a:prstGeom>
-          <a:noFill/>
-        </p:spPr>
-        <p:txBody>
-          <a:bodyPr wrap="square" rtlCol="0">
-            <a:spAutoFit/>
-          </a:bodyPr>
-          <a:lstStyle/>
-          <a:p>
-            <a:pPr algn="ctr"/>
-            <a:r>
-              <a:rPr lang="fr-FR" sz="1400" b="1" dirty="0"/>
-              <a:t>XL-320</a:t>
-            </a:r>
-          </a:p>
-        </p:txBody>
-      </p:sp>
-      <p:sp>
-        <p:nvSpPr>
-          <p:cNvPr id="86" name="ZoneTexte 85">
-            <a:extLst>
-              <a:ext uri="{FF2B5EF4-FFF2-40B4-BE49-F238E27FC236}">
-                <a16:creationId xmlns:a16="http://schemas.microsoft.com/office/drawing/2014/main" id="{BD6C7B24-F88E-4DC1-B112-0D743F0D7DF1}"/>
-              </a:ext>
-            </a:extLst>
-          </p:cNvPr>
-          <p:cNvSpPr txBox="1"/>
-          <p:nvPr/>
-        </p:nvSpPr>
-        <p:spPr>
-          <a:xfrm>
-            <a:off x="7464152" y="2996952"/>
-            <a:ext cx="648072" cy="307777"/>
-          </a:xfrm>
-          <a:prstGeom prst="rect">
-            <a:avLst/>
-          </a:prstGeom>
-          <a:noFill/>
-        </p:spPr>
-        <p:txBody>
-          <a:bodyPr wrap="square" rtlCol="0">
-            <a:spAutoFit/>
-          </a:bodyPr>
-          <a:lstStyle/>
-          <a:p>
-            <a:pPr algn="ctr"/>
-            <a:r>
-              <a:rPr lang="fr-FR" sz="1400" b="1" dirty="0"/>
-              <a:t>AX-12</a:t>
-            </a:r>
-          </a:p>
-        </p:txBody>
-      </p:sp>
-      <p:sp>
-        <p:nvSpPr>
-          <p:cNvPr id="87" name="Ellipse 86">
-            <a:extLst>
-              <a:ext uri="{FF2B5EF4-FFF2-40B4-BE49-F238E27FC236}">
-                <a16:creationId xmlns:a16="http://schemas.microsoft.com/office/drawing/2014/main" id="{61AB2B01-36CB-4310-AC41-E468DC894A4B}"/>
-              </a:ext>
-            </a:extLst>
-          </p:cNvPr>
-          <p:cNvSpPr/>
-          <p:nvPr/>
-        </p:nvSpPr>
-        <p:spPr>
-          <a:xfrm>
-            <a:off x="4871864" y="1196752"/>
+            <a:off x="3647728" y="2996952"/>
             <a:ext cx="180000" cy="180000"/>
           </a:xfrm>
           <a:prstGeom prst="ellipse">
@@ -4356,12 +4338,42 @@
           </a:p>
         </p:txBody>
       </p:sp>
-      <p:sp>
-        <p:nvSpPr>
-          <p:cNvPr id="88" name="Ellipse 87">
-            <a:extLst>
-              <a:ext uri="{FF2B5EF4-FFF2-40B4-BE49-F238E27FC236}">
-                <a16:creationId xmlns:a16="http://schemas.microsoft.com/office/drawing/2014/main" id="{EE630B52-3ADA-49B1-854D-3C07B621745F}"/>
+    </p:spTree>
+    <p:extLst>
+      <p:ext uri="{BB962C8B-B14F-4D97-AF65-F5344CB8AC3E}">
+        <p14:creationId xmlns:p14="http://schemas.microsoft.com/office/powerpoint/2010/main" val="1680176576"/>
+      </p:ext>
+    </p:extLst>
+  </p:cSld>
+  <p:clrMapOvr>
+    <a:masterClrMapping/>
+  </p:clrMapOvr>
+</p:sld>
+</file>
+
+<file path=ppt/slides/slide3.xml><?xml version="1.0" encoding="utf-8"?>
+<p:sld xmlns:a="http://schemas.openxmlformats.org/drawingml/2006/main" xmlns:r="http://schemas.openxmlformats.org/officeDocument/2006/relationships" xmlns:p="http://schemas.openxmlformats.org/presentationml/2006/main">
+  <p:cSld>
+    <p:spTree>
+      <p:nvGrpSpPr>
+        <p:cNvPr id="1" name=""/>
+        <p:cNvGrpSpPr/>
+        <p:nvPr/>
+      </p:nvGrpSpPr>
+      <p:grpSpPr>
+        <a:xfrm>
+          <a:off x="0" y="0"/>
+          <a:ext cx="0" cy="0"/>
+          <a:chOff x="0" y="0"/>
+          <a:chExt cx="0" cy="0"/>
+        </a:xfrm>
+      </p:grpSpPr>
+      <p:sp>
+        <p:nvSpPr>
+          <p:cNvPr id="5" name="Rectangle 4">
+            <a:extLst>
+              <a:ext uri="{FF2B5EF4-FFF2-40B4-BE49-F238E27FC236}">
+                <a16:creationId xmlns:a16="http://schemas.microsoft.com/office/drawing/2014/main" id="{7A15B4CD-B74D-46F5-8239-FDD50D545AE9}"/>
               </a:ext>
             </a:extLst>
           </p:cNvPr>
@@ -4370,30 +4382,32 @@
         </p:nvSpPr>
         <p:spPr>
           <a:xfrm>
-            <a:off x="7536160" y="2204864"/>
-            <a:ext cx="180000" cy="180000"/>
+            <a:off x="5411924" y="1412776"/>
+            <a:ext cx="1368152" cy="4032448"/>
           </a:xfrm>
-          <a:prstGeom prst="ellipse">
+          <a:prstGeom prst="rect">
             <a:avLst/>
           </a:prstGeom>
           <a:solidFill>
-            <a:schemeClr val="accent4"/>
+            <a:schemeClr val="accent6"/>
           </a:solidFill>
           <a:ln>
-            <a:noFill/>
+            <a:solidFill>
+              <a:schemeClr val="tx1"/>
+            </a:solidFill>
           </a:ln>
         </p:spPr>
         <p:style>
           <a:lnRef idx="2">
-            <a:schemeClr val="accent6">
+            <a:schemeClr val="accent1">
               <a:shade val="50000"/>
             </a:schemeClr>
           </a:lnRef>
           <a:fillRef idx="1">
-            <a:schemeClr val="accent6"/>
+            <a:schemeClr val="accent1"/>
           </a:fillRef>
           <a:effectRef idx="0">
-            <a:schemeClr val="accent6"/>
+            <a:schemeClr val="accent1"/>
           </a:effectRef>
           <a:fontRef idx="minor">
             <a:schemeClr val="lt1"/>
@@ -4404,16 +4418,19 @@
           <a:lstStyle/>
           <a:p>
             <a:pPr algn="ctr"/>
-            <a:endParaRPr lang="fr-FR"/>
-          </a:p>
-        </p:txBody>
-      </p:sp>
-      <p:sp>
-        <p:nvSpPr>
-          <p:cNvPr id="89" name="Ellipse 88">
-            <a:extLst>
-              <a:ext uri="{FF2B5EF4-FFF2-40B4-BE49-F238E27FC236}">
-                <a16:creationId xmlns:a16="http://schemas.microsoft.com/office/drawing/2014/main" id="{1FEA65E8-A40B-4EA0-94FE-F191408E9ECA}"/>
+            <a:r>
+              <a:rPr lang="fr-FR" dirty="0"/>
+              <a:t>Teensy 3.6</a:t>
+            </a:r>
+          </a:p>
+        </p:txBody>
+      </p:sp>
+      <p:sp>
+        <p:nvSpPr>
+          <p:cNvPr id="6" name="Rectangle 5">
+            <a:extLst>
+              <a:ext uri="{FF2B5EF4-FFF2-40B4-BE49-F238E27FC236}">
+                <a16:creationId xmlns:a16="http://schemas.microsoft.com/office/drawing/2014/main" id="{074B86F1-9B0C-4427-BF2B-1F3227C86AF7}"/>
               </a:ext>
             </a:extLst>
           </p:cNvPr>
@@ -4422,30 +4439,32 @@
         </p:nvSpPr>
         <p:spPr>
           <a:xfrm>
-            <a:off x="7536160" y="2852936"/>
-            <a:ext cx="180000" cy="180000"/>
+            <a:off x="7392144" y="3573016"/>
+            <a:ext cx="1368152" cy="864096"/>
           </a:xfrm>
-          <a:prstGeom prst="ellipse">
+          <a:prstGeom prst="rect">
             <a:avLst/>
           </a:prstGeom>
           <a:solidFill>
-            <a:schemeClr val="accent4"/>
+            <a:srgbClr val="7030A0"/>
           </a:solidFill>
           <a:ln>
-            <a:noFill/>
+            <a:solidFill>
+              <a:schemeClr val="tx1"/>
+            </a:solidFill>
           </a:ln>
         </p:spPr>
         <p:style>
           <a:lnRef idx="2">
-            <a:schemeClr val="accent6">
+            <a:schemeClr val="accent1">
               <a:shade val="50000"/>
             </a:schemeClr>
           </a:lnRef>
           <a:fillRef idx="1">
-            <a:schemeClr val="accent6"/>
+            <a:schemeClr val="accent1"/>
           </a:fillRef>
           <a:effectRef idx="0">
-            <a:schemeClr val="accent6"/>
+            <a:schemeClr val="accent1"/>
           </a:effectRef>
           <a:fontRef idx="minor">
             <a:schemeClr val="lt1"/>
@@ -4456,16 +4475,19 @@
           <a:lstStyle/>
           <a:p>
             <a:pPr algn="ctr"/>
-            <a:endParaRPr lang="fr-FR"/>
-          </a:p>
-        </p:txBody>
-      </p:sp>
-      <p:sp>
-        <p:nvSpPr>
-          <p:cNvPr id="90" name="Ellipse 89">
-            <a:extLst>
-              <a:ext uri="{FF2B5EF4-FFF2-40B4-BE49-F238E27FC236}">
-                <a16:creationId xmlns:a16="http://schemas.microsoft.com/office/drawing/2014/main" id="{DD8946EB-3268-436E-B527-719680E64E19}"/>
+            <a:r>
+              <a:rPr lang="fr-FR" dirty="0"/>
+              <a:t>DRV8825</a:t>
+            </a:r>
+          </a:p>
+        </p:txBody>
+      </p:sp>
+      <p:sp>
+        <p:nvSpPr>
+          <p:cNvPr id="7" name="Rectangle 6">
+            <a:extLst>
+              <a:ext uri="{FF2B5EF4-FFF2-40B4-BE49-F238E27FC236}">
+                <a16:creationId xmlns:a16="http://schemas.microsoft.com/office/drawing/2014/main" id="{B07FB330-5E07-433C-90B2-20A35966F50D}"/>
               </a:ext>
             </a:extLst>
           </p:cNvPr>
@@ -4473,31 +4495,33 @@
           <p:nvPr/>
         </p:nvSpPr>
         <p:spPr>
-          <a:xfrm>
-            <a:off x="7392144" y="1196752"/>
-            <a:ext cx="180000" cy="180000"/>
+          <a:xfrm rot="16200000">
+            <a:off x="8868308" y="4329100"/>
+            <a:ext cx="1368152" cy="864096"/>
           </a:xfrm>
-          <a:prstGeom prst="ellipse">
+          <a:prstGeom prst="rect">
             <a:avLst/>
           </a:prstGeom>
           <a:solidFill>
-            <a:schemeClr val="accent4"/>
+            <a:srgbClr val="7030A0"/>
           </a:solidFill>
           <a:ln>
-            <a:noFill/>
+            <a:solidFill>
+              <a:schemeClr val="tx1"/>
+            </a:solidFill>
           </a:ln>
         </p:spPr>
         <p:style>
           <a:lnRef idx="2">
-            <a:schemeClr val="accent6">
+            <a:schemeClr val="accent1">
               <a:shade val="50000"/>
             </a:schemeClr>
           </a:lnRef>
           <a:fillRef idx="1">
-            <a:schemeClr val="accent6"/>
+            <a:schemeClr val="accent1"/>
           </a:fillRef>
           <a:effectRef idx="0">
-            <a:schemeClr val="accent6"/>
+            <a:schemeClr val="accent1"/>
           </a:effectRef>
           <a:fontRef idx="minor">
             <a:schemeClr val="lt1"/>
@@ -4508,16 +4532,19 @@
           <a:lstStyle/>
           <a:p>
             <a:pPr algn="ctr"/>
-            <a:endParaRPr lang="fr-FR"/>
-          </a:p>
-        </p:txBody>
-      </p:sp>
-      <p:sp>
-        <p:nvSpPr>
-          <p:cNvPr id="91" name="Ellipse 90">
-            <a:extLst>
-              <a:ext uri="{FF2B5EF4-FFF2-40B4-BE49-F238E27FC236}">
-                <a16:creationId xmlns:a16="http://schemas.microsoft.com/office/drawing/2014/main" id="{3A7D2F06-B06B-402D-8640-17B76B6D47A5}"/>
+            <a:r>
+              <a:rPr lang="fr-FR" dirty="0"/>
+              <a:t>DRV8825</a:t>
+            </a:r>
+          </a:p>
+        </p:txBody>
+      </p:sp>
+      <p:sp>
+        <p:nvSpPr>
+          <p:cNvPr id="8" name="Rectangle 7">
+            <a:extLst>
+              <a:ext uri="{FF2B5EF4-FFF2-40B4-BE49-F238E27FC236}">
+                <a16:creationId xmlns:a16="http://schemas.microsoft.com/office/drawing/2014/main" id="{218184A4-19A9-4874-BD25-FC98ECCF46E4}"/>
               </a:ext>
             </a:extLst>
           </p:cNvPr>
@@ -4526,30 +4553,24 @@
         </p:nvSpPr>
         <p:spPr>
           <a:xfrm>
-            <a:off x="4511824" y="3212976"/>
-            <a:ext cx="180000" cy="180000"/>
+            <a:off x="7320136" y="764704"/>
+            <a:ext cx="2736304" cy="936104"/>
           </a:xfrm>
-          <a:prstGeom prst="ellipse">
+          <a:prstGeom prst="rect">
             <a:avLst/>
           </a:prstGeom>
-          <a:solidFill>
-            <a:schemeClr val="accent4"/>
-          </a:solidFill>
-          <a:ln>
-            <a:noFill/>
-          </a:ln>
         </p:spPr>
         <p:style>
           <a:lnRef idx="2">
-            <a:schemeClr val="accent6">
+            <a:schemeClr val="accent2">
               <a:shade val="50000"/>
             </a:schemeClr>
           </a:lnRef>
           <a:fillRef idx="1">
-            <a:schemeClr val="accent6"/>
+            <a:schemeClr val="accent2"/>
           </a:fillRef>
           <a:effectRef idx="0">
-            <a:schemeClr val="accent6"/>
+            <a:schemeClr val="accent2"/>
           </a:effectRef>
           <a:fontRef idx="minor">
             <a:schemeClr val="lt1"/>
@@ -4560,14 +4581,501 @@
           <a:lstStyle/>
           <a:p>
             <a:pPr algn="ctr"/>
-            <a:endParaRPr lang="fr-FR"/>
+            <a:r>
+              <a:rPr lang="fr-FR" dirty="0"/>
+              <a:t>Alimentation</a:t>
+            </a:r>
+          </a:p>
+        </p:txBody>
+      </p:sp>
+      <p:sp>
+        <p:nvSpPr>
+          <p:cNvPr id="9" name="Rectangle 8">
+            <a:extLst>
+              <a:ext uri="{FF2B5EF4-FFF2-40B4-BE49-F238E27FC236}">
+                <a16:creationId xmlns:a16="http://schemas.microsoft.com/office/drawing/2014/main" id="{4C2461CB-1E1C-4155-B4E8-1ACC403B82A1}"/>
+              </a:ext>
+            </a:extLst>
+          </p:cNvPr>
+          <p:cNvSpPr/>
+          <p:nvPr/>
+        </p:nvSpPr>
+        <p:spPr>
+          <a:xfrm rot="16200000">
+            <a:off x="3971764" y="4401108"/>
+            <a:ext cx="1188132" cy="396044"/>
+          </a:xfrm>
+          <a:prstGeom prst="rect">
+            <a:avLst/>
+          </a:prstGeom>
+          <a:solidFill>
+            <a:schemeClr val="bg1">
+              <a:lumMod val="75000"/>
+            </a:schemeClr>
+          </a:solidFill>
+          <a:ln>
+            <a:solidFill>
+              <a:schemeClr val="tx1"/>
+            </a:solidFill>
+          </a:ln>
+        </p:spPr>
+        <p:style>
+          <a:lnRef idx="2">
+            <a:schemeClr val="accent1">
+              <a:shade val="50000"/>
+            </a:schemeClr>
+          </a:lnRef>
+          <a:fillRef idx="1">
+            <a:schemeClr val="accent1"/>
+          </a:fillRef>
+          <a:effectRef idx="0">
+            <a:schemeClr val="accent1"/>
+          </a:effectRef>
+          <a:fontRef idx="minor">
+            <a:schemeClr val="lt1"/>
+          </a:fontRef>
+        </p:style>
+        <p:txBody>
+          <a:bodyPr rtlCol="0" anchor="ctr"/>
+          <a:lstStyle/>
+          <a:p>
+            <a:pPr algn="ctr"/>
+            <a:r>
+              <a:rPr lang="fr-FR" dirty="0"/>
+              <a:t>Conn. IHM</a:t>
+            </a:r>
+          </a:p>
+        </p:txBody>
+      </p:sp>
+      <p:sp>
+        <p:nvSpPr>
+          <p:cNvPr id="10" name="Rectangle 9">
+            <a:extLst>
+              <a:ext uri="{FF2B5EF4-FFF2-40B4-BE49-F238E27FC236}">
+                <a16:creationId xmlns:a16="http://schemas.microsoft.com/office/drawing/2014/main" id="{45BD9B13-B657-4645-9C9E-6139B78B0DA6}"/>
+              </a:ext>
+            </a:extLst>
+          </p:cNvPr>
+          <p:cNvSpPr/>
+          <p:nvPr/>
+        </p:nvSpPr>
+        <p:spPr>
+          <a:xfrm>
+            <a:off x="4295800" y="764704"/>
+            <a:ext cx="1260140" cy="396044"/>
+          </a:xfrm>
+          <a:prstGeom prst="rect">
+            <a:avLst/>
+          </a:prstGeom>
+          <a:solidFill>
+            <a:schemeClr val="bg1">
+              <a:lumMod val="75000"/>
+            </a:schemeClr>
+          </a:solidFill>
+          <a:ln>
+            <a:solidFill>
+              <a:schemeClr val="tx1"/>
+            </a:solidFill>
+          </a:ln>
+        </p:spPr>
+        <p:style>
+          <a:lnRef idx="2">
+            <a:schemeClr val="accent1">
+              <a:shade val="50000"/>
+            </a:schemeClr>
+          </a:lnRef>
+          <a:fillRef idx="1">
+            <a:schemeClr val="accent1"/>
+          </a:fillRef>
+          <a:effectRef idx="0">
+            <a:schemeClr val="accent1"/>
+          </a:effectRef>
+          <a:fontRef idx="minor">
+            <a:schemeClr val="lt1"/>
+          </a:fontRef>
+        </p:style>
+        <p:txBody>
+          <a:bodyPr rtlCol="0" anchor="ctr"/>
+          <a:lstStyle/>
+          <a:p>
+            <a:pPr algn="ctr"/>
+            <a:r>
+              <a:rPr lang="fr-FR" dirty="0"/>
+              <a:t>Conn. Lidar</a:t>
+            </a:r>
+          </a:p>
+        </p:txBody>
+      </p:sp>
+      <p:sp>
+        <p:nvSpPr>
+          <p:cNvPr id="11" name="Rectangle 10">
+            <a:extLst>
+              <a:ext uri="{FF2B5EF4-FFF2-40B4-BE49-F238E27FC236}">
+                <a16:creationId xmlns:a16="http://schemas.microsoft.com/office/drawing/2014/main" id="{163A58BD-10C2-46CB-B716-A698431FF782}"/>
+              </a:ext>
+            </a:extLst>
+          </p:cNvPr>
+          <p:cNvSpPr/>
+          <p:nvPr/>
+        </p:nvSpPr>
+        <p:spPr>
+          <a:xfrm>
+            <a:off x="4799856" y="1844824"/>
+            <a:ext cx="2664296" cy="1296144"/>
+          </a:xfrm>
+          <a:prstGeom prst="rect">
+            <a:avLst/>
+          </a:prstGeom>
+          <a:solidFill>
+            <a:schemeClr val="bg1">
+              <a:lumMod val="75000"/>
+            </a:schemeClr>
+          </a:solidFill>
+          <a:ln>
+            <a:solidFill>
+              <a:schemeClr val="tx1"/>
+            </a:solidFill>
+          </a:ln>
+        </p:spPr>
+        <p:style>
+          <a:lnRef idx="2">
+            <a:schemeClr val="accent1">
+              <a:shade val="50000"/>
+            </a:schemeClr>
+          </a:lnRef>
+          <a:fillRef idx="1">
+            <a:schemeClr val="accent1"/>
+          </a:fillRef>
+          <a:effectRef idx="0">
+            <a:schemeClr val="accent1"/>
+          </a:effectRef>
+          <a:fontRef idx="minor">
+            <a:schemeClr val="lt1"/>
+          </a:fontRef>
+        </p:style>
+        <p:txBody>
+          <a:bodyPr rtlCol="0" anchor="ctr"/>
+          <a:lstStyle/>
+          <a:p>
+            <a:pPr algn="ctr"/>
+            <a:r>
+              <a:rPr lang="fr-FR" dirty="0"/>
+              <a:t>Conn. Shield</a:t>
+            </a:r>
+          </a:p>
+          <a:p>
+            <a:pPr algn="ctr"/>
+            <a:r>
+              <a:rPr lang="fr-FR" dirty="0"/>
+              <a:t>actionneurs</a:t>
+            </a:r>
+          </a:p>
+        </p:txBody>
+      </p:sp>
+      <p:sp>
+        <p:nvSpPr>
+          <p:cNvPr id="12" name="Rectangle 11">
+            <a:extLst>
+              <a:ext uri="{FF2B5EF4-FFF2-40B4-BE49-F238E27FC236}">
+                <a16:creationId xmlns:a16="http://schemas.microsoft.com/office/drawing/2014/main" id="{D81105F4-FDB8-48AF-909B-3A33518FAFA8}"/>
+              </a:ext>
+            </a:extLst>
+          </p:cNvPr>
+          <p:cNvSpPr/>
+          <p:nvPr/>
+        </p:nvSpPr>
+        <p:spPr>
+          <a:xfrm>
+            <a:off x="5159896" y="5589240"/>
+            <a:ext cx="1800200" cy="396044"/>
+          </a:xfrm>
+          <a:prstGeom prst="rect">
+            <a:avLst/>
+          </a:prstGeom>
+          <a:solidFill>
+            <a:schemeClr val="bg1">
+              <a:lumMod val="75000"/>
+            </a:schemeClr>
+          </a:solidFill>
+          <a:ln>
+            <a:solidFill>
+              <a:schemeClr val="tx1"/>
+            </a:solidFill>
+          </a:ln>
+        </p:spPr>
+        <p:style>
+          <a:lnRef idx="2">
+            <a:schemeClr val="accent1">
+              <a:shade val="50000"/>
+            </a:schemeClr>
+          </a:lnRef>
+          <a:fillRef idx="1">
+            <a:schemeClr val="accent1"/>
+          </a:fillRef>
+          <a:effectRef idx="0">
+            <a:schemeClr val="accent1"/>
+          </a:effectRef>
+          <a:fontRef idx="minor">
+            <a:schemeClr val="lt1"/>
+          </a:fontRef>
+        </p:style>
+        <p:txBody>
+          <a:bodyPr rtlCol="0" anchor="ctr"/>
+          <a:lstStyle/>
+          <a:p>
+            <a:pPr algn="ctr"/>
+            <a:r>
+              <a:rPr lang="fr-FR" dirty="0"/>
+              <a:t>Conn. Codeurs</a:t>
+            </a:r>
+          </a:p>
+        </p:txBody>
+      </p:sp>
+      <p:sp>
+        <p:nvSpPr>
+          <p:cNvPr id="13" name="Rectangle 12">
+            <a:extLst>
+              <a:ext uri="{FF2B5EF4-FFF2-40B4-BE49-F238E27FC236}">
+                <a16:creationId xmlns:a16="http://schemas.microsoft.com/office/drawing/2014/main" id="{295D4B9C-F992-4BEA-8D0C-3554B067FF1E}"/>
+              </a:ext>
+            </a:extLst>
+          </p:cNvPr>
+          <p:cNvSpPr/>
+          <p:nvPr/>
+        </p:nvSpPr>
+        <p:spPr>
+          <a:xfrm rot="16200000">
+            <a:off x="9516380" y="3897052"/>
+            <a:ext cx="1620180" cy="396044"/>
+          </a:xfrm>
+          <a:prstGeom prst="rect">
+            <a:avLst/>
+          </a:prstGeom>
+          <a:solidFill>
+            <a:schemeClr val="bg1">
+              <a:lumMod val="75000"/>
+            </a:schemeClr>
+          </a:solidFill>
+          <a:ln>
+            <a:solidFill>
+              <a:schemeClr val="tx1"/>
+            </a:solidFill>
+          </a:ln>
+        </p:spPr>
+        <p:style>
+          <a:lnRef idx="2">
+            <a:schemeClr val="accent1">
+              <a:shade val="50000"/>
+            </a:schemeClr>
+          </a:lnRef>
+          <a:fillRef idx="1">
+            <a:schemeClr val="accent1"/>
+          </a:fillRef>
+          <a:effectRef idx="0">
+            <a:schemeClr val="accent1"/>
+          </a:effectRef>
+          <a:fontRef idx="minor">
+            <a:schemeClr val="lt1"/>
+          </a:fontRef>
+        </p:style>
+        <p:txBody>
+          <a:bodyPr rtlCol="0" anchor="ctr"/>
+          <a:lstStyle/>
+          <a:p>
+            <a:pPr algn="ctr"/>
+            <a:r>
+              <a:rPr lang="fr-FR" dirty="0"/>
+              <a:t>Conn. Moteurs</a:t>
+            </a:r>
+          </a:p>
+        </p:txBody>
+      </p:sp>
+      <p:sp>
+        <p:nvSpPr>
+          <p:cNvPr id="14" name="Rectangle 13">
+            <a:extLst>
+              <a:ext uri="{FF2B5EF4-FFF2-40B4-BE49-F238E27FC236}">
+                <a16:creationId xmlns:a16="http://schemas.microsoft.com/office/drawing/2014/main" id="{1E0AE9AD-ACE1-4C58-BB36-9B73EF1A8FEC}"/>
+              </a:ext>
+            </a:extLst>
+          </p:cNvPr>
+          <p:cNvSpPr/>
+          <p:nvPr/>
+        </p:nvSpPr>
+        <p:spPr>
+          <a:xfrm>
+            <a:off x="8544272" y="1916832"/>
+            <a:ext cx="1944216" cy="396044"/>
+          </a:xfrm>
+          <a:prstGeom prst="rect">
+            <a:avLst/>
+          </a:prstGeom>
+          <a:solidFill>
+            <a:schemeClr val="bg1">
+              <a:lumMod val="75000"/>
+            </a:schemeClr>
+          </a:solidFill>
+          <a:ln>
+            <a:solidFill>
+              <a:schemeClr val="tx1"/>
+            </a:solidFill>
+          </a:ln>
+        </p:spPr>
+        <p:style>
+          <a:lnRef idx="2">
+            <a:schemeClr val="accent1">
+              <a:shade val="50000"/>
+            </a:schemeClr>
+          </a:lnRef>
+          <a:fillRef idx="1">
+            <a:schemeClr val="accent1"/>
+          </a:fillRef>
+          <a:effectRef idx="0">
+            <a:schemeClr val="accent1"/>
+          </a:effectRef>
+          <a:fontRef idx="minor">
+            <a:schemeClr val="lt1"/>
+          </a:fontRef>
+        </p:style>
+        <p:txBody>
+          <a:bodyPr rtlCol="0" anchor="ctr"/>
+          <a:lstStyle/>
+          <a:p>
+            <a:pPr algn="ctr"/>
+            <a:r>
+              <a:rPr lang="fr-FR" dirty="0"/>
+              <a:t>Conn. Tirette</a:t>
+            </a:r>
+          </a:p>
+        </p:txBody>
+      </p:sp>
+      <p:sp>
+        <p:nvSpPr>
+          <p:cNvPr id="15" name="Rectangle 14">
+            <a:extLst>
+              <a:ext uri="{FF2B5EF4-FFF2-40B4-BE49-F238E27FC236}">
+                <a16:creationId xmlns:a16="http://schemas.microsoft.com/office/drawing/2014/main" id="{491EC577-F34D-416B-BC2A-B6C7CF9FDECE}"/>
+              </a:ext>
+            </a:extLst>
+          </p:cNvPr>
+          <p:cNvSpPr/>
+          <p:nvPr/>
+        </p:nvSpPr>
+        <p:spPr>
+          <a:xfrm>
+            <a:off x="8544272" y="2420888"/>
+            <a:ext cx="1944216" cy="396044"/>
+          </a:xfrm>
+          <a:prstGeom prst="rect">
+            <a:avLst/>
+          </a:prstGeom>
+          <a:solidFill>
+            <a:schemeClr val="bg1">
+              <a:lumMod val="75000"/>
+            </a:schemeClr>
+          </a:solidFill>
+          <a:ln>
+            <a:solidFill>
+              <a:schemeClr val="tx1"/>
+            </a:solidFill>
+          </a:ln>
+        </p:spPr>
+        <p:style>
+          <a:lnRef idx="2">
+            <a:schemeClr val="accent1">
+              <a:shade val="50000"/>
+            </a:schemeClr>
+          </a:lnRef>
+          <a:fillRef idx="1">
+            <a:schemeClr val="accent1"/>
+          </a:fillRef>
+          <a:effectRef idx="0">
+            <a:schemeClr val="accent1"/>
+          </a:effectRef>
+          <a:fontRef idx="minor">
+            <a:schemeClr val="lt1"/>
+          </a:fontRef>
+        </p:style>
+        <p:txBody>
+          <a:bodyPr rtlCol="0" anchor="ctr"/>
+          <a:lstStyle/>
+          <a:p>
+            <a:pPr algn="ctr"/>
+            <a:r>
+              <a:rPr lang="fr-FR" dirty="0"/>
+              <a:t>Conn. Microswitch</a:t>
+            </a:r>
+          </a:p>
+        </p:txBody>
+      </p:sp>
+      <p:sp>
+        <p:nvSpPr>
+          <p:cNvPr id="16" name="Rectangle 15">
+            <a:extLst>
+              <a:ext uri="{FF2B5EF4-FFF2-40B4-BE49-F238E27FC236}">
+                <a16:creationId xmlns:a16="http://schemas.microsoft.com/office/drawing/2014/main" id="{9A8227D0-6B2A-4D86-8374-83514548ECB1}"/>
+              </a:ext>
+            </a:extLst>
+          </p:cNvPr>
+          <p:cNvSpPr/>
+          <p:nvPr/>
+        </p:nvSpPr>
+        <p:spPr>
+          <a:xfrm rot="5400000">
+            <a:off x="3845750" y="3014954"/>
+            <a:ext cx="1188132" cy="576064"/>
+          </a:xfrm>
+          <a:prstGeom prst="rect">
+            <a:avLst/>
+          </a:prstGeom>
+          <a:solidFill>
+            <a:schemeClr val="bg1">
+              <a:lumMod val="75000"/>
+            </a:schemeClr>
+          </a:solidFill>
+          <a:ln>
+            <a:solidFill>
+              <a:schemeClr val="tx1"/>
+            </a:solidFill>
+          </a:ln>
+        </p:spPr>
+        <p:style>
+          <a:lnRef idx="2">
+            <a:schemeClr val="accent1">
+              <a:shade val="50000"/>
+            </a:schemeClr>
+          </a:lnRef>
+          <a:fillRef idx="1">
+            <a:schemeClr val="accent1"/>
+          </a:fillRef>
+          <a:effectRef idx="0">
+            <a:schemeClr val="accent1"/>
+          </a:effectRef>
+          <a:fontRef idx="minor">
+            <a:schemeClr val="lt1"/>
+          </a:fontRef>
+        </p:style>
+        <p:txBody>
+          <a:bodyPr rtlCol="0" anchor="ctr"/>
+          <a:lstStyle/>
+          <a:p>
+            <a:pPr algn="ctr"/>
+            <a:r>
+              <a:rPr lang="fr-FR" dirty="0"/>
+              <a:t>Conn. </a:t>
+            </a:r>
+            <a:r>
+              <a:rPr lang="fr-FR" dirty="0" err="1"/>
+              <a:t>nRF</a:t>
+            </a:r>
+            <a:endParaRPr lang="fr-FR" dirty="0"/>
           </a:p>
         </p:txBody>
       </p:sp>
     </p:spTree>
     <p:extLst>
       <p:ext uri="{BB962C8B-B14F-4D97-AF65-F5344CB8AC3E}">
-        <p14:creationId xmlns:p14="http://schemas.microsoft.com/office/powerpoint/2010/main" val="1680176576"/>
+        <p14:creationId xmlns:p14="http://schemas.microsoft.com/office/powerpoint/2010/main" val="4050760837"/>
       </p:ext>
     </p:extLst>
   </p:cSld>

</xml_diff>